<commit_message>
CISC 870 Presentation - Grabbed papers
</commit_message>
<xml_diff>
--- a/ImNO2017/Poster/ChurchSpinalVisualization.pptx
+++ b/ImNO2017/Poster/ChurchSpinalVisualization.pptx
@@ -4308,8 +4308,8 @@
         </p:nvSpPr>
         <p:spPr bwMode="auto">
           <a:xfrm>
-            <a:off x="689449" y="6480625"/>
-            <a:ext cx="9325691" cy="9864275"/>
+            <a:off x="689449" y="6480626"/>
+            <a:ext cx="9325691" cy="9646408"/>
           </a:xfrm>
           <a:prstGeom prst="rect">
             <a:avLst/>
@@ -4353,19 +4353,11 @@
             </a:r>
             <a:r>
               <a:rPr lang="en-US" sz="3600" i="1" dirty="0" smtClean="0"/>
-              <a:t>et </a:t>
-            </a:r>
-            <a:r>
-              <a:rPr lang="en-US" sz="3600" i="1" dirty="0" smtClean="0"/>
-              <a:t>al</a:t>
+              <a:t>et al</a:t>
             </a:r>
             <a:r>
               <a:rPr lang="en-US" sz="3600" dirty="0" smtClean="0"/>
-              <a:t>. </a:t>
-            </a:r>
-            <a:r>
-              <a:rPr lang="en-US" sz="3600" dirty="0" smtClean="0"/>
-              <a:t>2014)</a:t>
+              <a:t>. 2014)</a:t>
             </a:r>
           </a:p>
           <a:p>
@@ -4382,7 +4374,15 @@
             </a:pPr>
             <a:r>
               <a:rPr lang="en-US" sz="3600" dirty="0" smtClean="0"/>
-              <a:t>Assessment methods use landmark locations rather than familiar , macroscopic visualizations such as </a:t>
+              <a:t>Assessment methods use landmark locations rather than </a:t>
+            </a:r>
+            <a:r>
+              <a:rPr lang="en-US" sz="3600" dirty="0" smtClean="0"/>
+              <a:t>familiar, </a:t>
+            </a:r>
+            <a:r>
+              <a:rPr lang="en-US" sz="3600" dirty="0" smtClean="0"/>
+              <a:t>macroscopic visualizations such as </a:t>
             </a:r>
             <a:br>
               <a:rPr lang="en-US" sz="3600" dirty="0" smtClean="0"/>
@@ -5699,9 +5699,27 @@
                 <a:tableStyleId>{073A0DAA-6AF3-43AB-8588-CEC1D06C72B9}</a:tableStyleId>
               </a:tblPr>
               <a:tblGrid>
-                <a:gridCol w="5078014"/>
-                <a:gridCol w="5078014"/>
-                <a:gridCol w="5078014"/>
+                <a:gridCol w="5078014">
+                  <a:extLst>
+                    <a:ext uri="{9D8B030D-6E8A-4147-A177-3AD203B41FA5}">
+                      <a16:colId xmlns:a16="http://schemas.microsoft.com/office/drawing/2014/main" val="20000"/>
+                    </a:ext>
+                  </a:extLst>
+                </a:gridCol>
+                <a:gridCol w="5078014">
+                  <a:extLst>
+                    <a:ext uri="{9D8B030D-6E8A-4147-A177-3AD203B41FA5}">
+                      <a16:colId xmlns:a16="http://schemas.microsoft.com/office/drawing/2014/main" val="20001"/>
+                    </a:ext>
+                  </a:extLst>
+                </a:gridCol>
+                <a:gridCol w="5078014">
+                  <a:extLst>
+                    <a:ext uri="{9D8B030D-6E8A-4147-A177-3AD203B41FA5}">
+                      <a16:colId xmlns:a16="http://schemas.microsoft.com/office/drawing/2014/main" val="20002"/>
+                    </a:ext>
+                  </a:extLst>
+                </a:gridCol>
               </a:tblGrid>
               <a:tr h="1306126">
                 <a:tc>
@@ -5917,6 +5935,11 @@
                     </a:solidFill>
                   </a:tcPr>
                 </a:tc>
+                <a:extLst>
+                  <a:ext uri="{0D108BD9-81ED-4DB2-BD59-A6C34878D82A}">
+                    <a16:rowId xmlns:a16="http://schemas.microsoft.com/office/drawing/2014/main" val="10000"/>
+                  </a:ext>
+                </a:extLst>
               </a:tr>
               <a:tr h="694748">
                 <a:tc>
@@ -6075,6 +6098,11 @@
                     </a:lnB>
                   </a:tcPr>
                 </a:tc>
+                <a:extLst>
+                  <a:ext uri="{0D108BD9-81ED-4DB2-BD59-A6C34878D82A}">
+                    <a16:rowId xmlns:a16="http://schemas.microsoft.com/office/drawing/2014/main" val="10001"/>
+                  </a:ext>
+                </a:extLst>
               </a:tr>
               <a:tr h="694748">
                 <a:tc>
@@ -6233,6 +6261,11 @@
                     </a:lnB>
                   </a:tcPr>
                 </a:tc>
+                <a:extLst>
+                  <a:ext uri="{0D108BD9-81ED-4DB2-BD59-A6C34878D82A}">
+                    <a16:rowId xmlns:a16="http://schemas.microsoft.com/office/drawing/2014/main" val="10002"/>
+                  </a:ext>
+                </a:extLst>
               </a:tr>
               <a:tr h="694748">
                 <a:tc>
@@ -6391,6 +6424,11 @@
                     </a:lnB>
                   </a:tcPr>
                 </a:tc>
+                <a:extLst>
+                  <a:ext uri="{0D108BD9-81ED-4DB2-BD59-A6C34878D82A}">
+                    <a16:rowId xmlns:a16="http://schemas.microsoft.com/office/drawing/2014/main" val="10003"/>
+                  </a:ext>
+                </a:extLst>
               </a:tr>
               <a:tr h="694748">
                 <a:tc>
@@ -6549,6 +6587,11 @@
                     </a:lnB>
                   </a:tcPr>
                 </a:tc>
+                <a:extLst>
+                  <a:ext uri="{0D108BD9-81ED-4DB2-BD59-A6C34878D82A}">
+                    <a16:rowId xmlns:a16="http://schemas.microsoft.com/office/drawing/2014/main" val="10004"/>
+                  </a:ext>
+                </a:extLst>
               </a:tr>
               <a:tr h="694748">
                 <a:tc>
@@ -6707,6 +6750,11 @@
                     </a:lnB>
                   </a:tcPr>
                 </a:tc>
+                <a:extLst>
+                  <a:ext uri="{0D108BD9-81ED-4DB2-BD59-A6C34878D82A}">
+                    <a16:rowId xmlns:a16="http://schemas.microsoft.com/office/drawing/2014/main" val="10005"/>
+                  </a:ext>
+                </a:extLst>
               </a:tr>
             </a:tbl>
           </a:graphicData>
@@ -6899,22 +6947,13 @@
             </a:r>
             <a:r>
               <a:rPr lang="en-CA" sz="3000" dirty="0" smtClean="0"/>
-              <a:t> Registration computes transforms displacing model points to patient’s (left</a:t>
-            </a:r>
-            <a:r>
-              <a:rPr lang="en-CA" sz="3000" dirty="0" smtClean="0"/>
-              <a:t>);</a:t>
-            </a:r>
-            <a:endParaRPr lang="en-CA" sz="3000" dirty="0" smtClean="0"/>
+              <a:t> Registration computes transforms displacing model points to patient’s (left);</a:t>
+            </a:r>
           </a:p>
           <a:p>
             <a:r>
               <a:rPr lang="en-US" sz="3000" dirty="0" smtClean="0"/>
-              <a:t>Transforms interpolated as thin-plate spline, warping healthy model to patient anatomy (right</a:t>
-            </a:r>
-            <a:r>
-              <a:rPr lang="en-US" sz="3000" dirty="0" smtClean="0"/>
-              <a:t>)</a:t>
+              <a:t>Transforms interpolated as thin-plate spline, warping healthy model to patient anatomy (right)</a:t>
             </a:r>
             <a:endParaRPr lang="en-CA" sz="3000" dirty="0" smtClean="0"/>
           </a:p>
@@ -6952,13 +6991,20 @@
             </a:r>
             <a:r>
               <a:rPr lang="en-CA" sz="3000" dirty="0" smtClean="0"/>
-              <a:t> Registrations compared to CT-derived patient ground-truth. Error map shows distance between </a:t>
+              <a:t> Registrations compared to CT-derived patient </a:t>
             </a:r>
             <a:r>
               <a:rPr lang="en-CA" sz="3000" dirty="0" smtClean="0"/>
-              <a:t>surfaces</a:t>
-            </a:r>
-            <a:endParaRPr lang="en-CA" sz="3000" dirty="0" smtClean="0"/>
+              <a:t>ground-truth</a:t>
+            </a:r>
+            <a:r>
+              <a:rPr lang="en-CA" sz="3000" smtClean="0"/>
+              <a:t>, error </a:t>
+            </a:r>
+            <a:r>
+              <a:rPr lang="en-CA" sz="3000" dirty="0" smtClean="0"/>
+              <a:t>map shows distance between surfaces</a:t>
+            </a:r>
           </a:p>
         </p:txBody>
       </p:sp>

</xml_diff>